<commit_message>
l07 post lecture tweaks
</commit_message>
<xml_diff>
--- a/instructor/l07/l07-pad.pptx
+++ b/instructor/l07/l07-pad.pptx
@@ -3031,7 +3031,7 @@
           <a:p>
             <a:r>
               <a:rPr lang="en-US" dirty="0"/>
-              <a:t>the reference rule and helpers</a:t>
+              <a:t>the reference rule and natural helpers</a:t>
             </a:r>
           </a:p>
         </p:txBody>
@@ -3067,7 +3067,7 @@
             <a:pPr algn="ctr"/>
             <a:r>
               <a:rPr lang="en-US" sz="3300" dirty="0"/>
-              <a:t>lecture 07 – 2 main topics</a:t>
+              <a:t>lecture 07 – main topics</a:t>
             </a:r>
           </a:p>
         </p:txBody>
@@ -4698,10 +4698,10 @@
       </p:grpSpPr>
       <p:pic>
         <p:nvPicPr>
-          <p:cNvPr id="4" name="Picture 3">
+          <p:cNvPr id="5" name="Picture 4">
             <a:extLst>
               <a:ext uri="{FF2B5EF4-FFF2-40B4-BE49-F238E27FC236}">
-                <a16:creationId xmlns:a16="http://schemas.microsoft.com/office/drawing/2014/main" id="{F745A7CB-9AB6-F8EC-FD6B-4BA6ADE2F75D}"/>
+                <a16:creationId xmlns:a16="http://schemas.microsoft.com/office/drawing/2014/main" id="{A966B6FF-7872-3CF9-8C22-E299C421B1EE}"/>
               </a:ext>
             </a:extLst>
           </p:cNvPr>
@@ -4718,8 +4718,8 @@
         </p:blipFill>
         <p:spPr>
           <a:xfrm>
-            <a:off x="685800" y="11349"/>
-            <a:ext cx="7772400" cy="6835301"/>
+            <a:off x="685800" y="237926"/>
+            <a:ext cx="7772400" cy="6382148"/>
           </a:xfrm>
           <a:prstGeom prst="rect">
             <a:avLst/>

</xml_diff>